<commit_message>
fix typos in images
</commit_message>
<xml_diff>
--- a/images/colr.pptx
+++ b/images/colr.pptx
@@ -505,7 +505,7 @@
           <a:p>
             <a:fld id="{CE8E396D-3440-46C8-B410-EEC8779F859B}" type="datetimeFigureOut">
               <a:rPr lang="en-US" smtClean="0"/>
-              <a:t>2020-12-14</a:t>
+              <a:t>7/24/2021</a:t>
             </a:fld>
             <a:endParaRPr lang="en-US"/>
           </a:p>
@@ -703,7 +703,7 @@
           <a:p>
             <a:fld id="{CE8E396D-3440-46C8-B410-EEC8779F859B}" type="datetimeFigureOut">
               <a:rPr lang="en-US" smtClean="0"/>
-              <a:t>2020-12-14</a:t>
+              <a:t>7/24/2021</a:t>
             </a:fld>
             <a:endParaRPr lang="en-US"/>
           </a:p>
@@ -911,7 +911,7 @@
           <a:p>
             <a:fld id="{CE8E396D-3440-46C8-B410-EEC8779F859B}" type="datetimeFigureOut">
               <a:rPr lang="en-US" smtClean="0"/>
-              <a:t>2020-12-14</a:t>
+              <a:t>7/24/2021</a:t>
             </a:fld>
             <a:endParaRPr lang="en-US"/>
           </a:p>
@@ -1109,7 +1109,7 @@
           <a:p>
             <a:fld id="{CE8E396D-3440-46C8-B410-EEC8779F859B}" type="datetimeFigureOut">
               <a:rPr lang="en-US" smtClean="0"/>
-              <a:t>2020-12-14</a:t>
+              <a:t>7/24/2021</a:t>
             </a:fld>
             <a:endParaRPr lang="en-US"/>
           </a:p>
@@ -1384,7 +1384,7 @@
           <a:p>
             <a:fld id="{CE8E396D-3440-46C8-B410-EEC8779F859B}" type="datetimeFigureOut">
               <a:rPr lang="en-US" smtClean="0"/>
-              <a:t>2020-12-14</a:t>
+              <a:t>7/24/2021</a:t>
             </a:fld>
             <a:endParaRPr lang="en-US"/>
           </a:p>
@@ -1649,7 +1649,7 @@
           <a:p>
             <a:fld id="{CE8E396D-3440-46C8-B410-EEC8779F859B}" type="datetimeFigureOut">
               <a:rPr lang="en-US" smtClean="0"/>
-              <a:t>2020-12-14</a:t>
+              <a:t>7/24/2021</a:t>
             </a:fld>
             <a:endParaRPr lang="en-US"/>
           </a:p>
@@ -2061,7 +2061,7 @@
           <a:p>
             <a:fld id="{CE8E396D-3440-46C8-B410-EEC8779F859B}" type="datetimeFigureOut">
               <a:rPr lang="en-US" smtClean="0"/>
-              <a:t>2020-12-14</a:t>
+              <a:t>7/24/2021</a:t>
             </a:fld>
             <a:endParaRPr lang="en-US"/>
           </a:p>
@@ -2202,7 +2202,7 @@
           <a:p>
             <a:fld id="{CE8E396D-3440-46C8-B410-EEC8779F859B}" type="datetimeFigureOut">
               <a:rPr lang="en-US" smtClean="0"/>
-              <a:t>2020-12-14</a:t>
+              <a:t>7/24/2021</a:t>
             </a:fld>
             <a:endParaRPr lang="en-US"/>
           </a:p>
@@ -2315,7 +2315,7 @@
           <a:p>
             <a:fld id="{CE8E396D-3440-46C8-B410-EEC8779F859B}" type="datetimeFigureOut">
               <a:rPr lang="en-US" smtClean="0"/>
-              <a:t>2020-12-14</a:t>
+              <a:t>7/24/2021</a:t>
             </a:fld>
             <a:endParaRPr lang="en-US"/>
           </a:p>
@@ -2626,7 +2626,7 @@
           <a:p>
             <a:fld id="{CE8E396D-3440-46C8-B410-EEC8779F859B}" type="datetimeFigureOut">
               <a:rPr lang="en-US" smtClean="0"/>
-              <a:t>2020-12-14</a:t>
+              <a:t>7/24/2021</a:t>
             </a:fld>
             <a:endParaRPr lang="en-US"/>
           </a:p>
@@ -2914,7 +2914,7 @@
           <a:p>
             <a:fld id="{CE8E396D-3440-46C8-B410-EEC8779F859B}" type="datetimeFigureOut">
               <a:rPr lang="en-US" smtClean="0"/>
-              <a:t>2020-12-14</a:t>
+              <a:t>7/24/2021</a:t>
             </a:fld>
             <a:endParaRPr lang="en-US"/>
           </a:p>
@@ -3155,7 +3155,7 @@
           <a:p>
             <a:fld id="{CE8E396D-3440-46C8-B410-EEC8779F859B}" type="datetimeFigureOut">
               <a:rPr lang="en-US" smtClean="0"/>
-              <a:t>2020-12-14</a:t>
+              <a:t>7/24/2021</a:t>
             </a:fld>
             <a:endParaRPr lang="en-US"/>
           </a:p>
@@ -5035,7 +5035,7 @@
         <p:spPr>
           <a:xfrm>
             <a:off x="2142395" y="2097516"/>
-            <a:ext cx="1213794" cy="261610"/>
+            <a:ext cx="1069524" cy="261610"/>
           </a:xfrm>
           <a:prstGeom prst="rect">
             <a:avLst/>
@@ -5050,7 +5050,7 @@
           <a:p>
             <a:r>
               <a:rPr lang="en-CA" sz="1100" noProof="1"/>
-              <a:t>PaintTransformed</a:t>
+              <a:t>PaintTransform</a:t>
             </a:r>
           </a:p>
         </p:txBody>
@@ -5783,7 +5783,7 @@
         <p:spPr>
           <a:xfrm>
             <a:off x="2142395" y="2097516"/>
-            <a:ext cx="1213794" cy="261610"/>
+            <a:ext cx="1069524" cy="261610"/>
           </a:xfrm>
           <a:prstGeom prst="rect">
             <a:avLst/>
@@ -5798,7 +5798,7 @@
           <a:p>
             <a:r>
               <a:rPr lang="en-CA" sz="1100" noProof="1"/>
-              <a:t>PaintTransformed</a:t>
+              <a:t>PaintTransform</a:t>
             </a:r>
           </a:p>
         </p:txBody>
@@ -10683,7 +10683,7 @@
         <p:spPr>
           <a:xfrm>
             <a:off x="3960477" y="1440034"/>
-            <a:ext cx="1162498" cy="261610"/>
+            <a:ext cx="1010213" cy="261610"/>
           </a:xfrm>
           <a:prstGeom prst="rect">
             <a:avLst/>
@@ -10698,7 +10698,7 @@
           <a:p>
             <a:r>
               <a:rPr lang="en-CA" sz="1100" noProof="1"/>
-              <a:t>LayerV1List table</a:t>
+              <a:t>LayerList table</a:t>
             </a:r>
           </a:p>
         </p:txBody>
@@ -14967,7 +14967,7 @@
         <p:spPr>
           <a:xfrm>
             <a:off x="4242804" y="1643868"/>
-            <a:ext cx="1162498" cy="261610"/>
+            <a:ext cx="1010213" cy="261610"/>
           </a:xfrm>
           <a:prstGeom prst="rect">
             <a:avLst/>
@@ -14982,7 +14982,7 @@
           <a:p>
             <a:r>
               <a:rPr lang="en-CA" sz="1100" noProof="1"/>
-              <a:t>LayerV1List table</a:t>
+              <a:t>LayerList table</a:t>
             </a:r>
           </a:p>
         </p:txBody>
@@ -15647,7 +15647,7 @@
         <p:spPr>
           <a:xfrm>
             <a:off x="1309768" y="2769109"/>
-            <a:ext cx="1343638" cy="261610"/>
+            <a:ext cx="1483098" cy="261610"/>
           </a:xfrm>
           <a:prstGeom prst="rect">
             <a:avLst/>
@@ -15662,7 +15662,7 @@
           <a:p>
             <a:r>
               <a:rPr lang="en-CA" sz="1100" dirty="0"/>
-              <a:t>BaseGlyphV1Record</a:t>
+              <a:t>BaseGlyphPaintRecord</a:t>
             </a:r>
             <a:endParaRPr lang="en-US" sz="1100" dirty="0"/>
           </a:p>
@@ -16434,8 +16434,8 @@
         </p:nvSpPr>
         <p:spPr>
           <a:xfrm>
-            <a:off x="1868075" y="2325811"/>
-            <a:ext cx="1343638" cy="261610"/>
+            <a:off x="1800963" y="2325811"/>
+            <a:ext cx="1483098" cy="261610"/>
           </a:xfrm>
           <a:prstGeom prst="rect">
             <a:avLst/>
@@ -16448,9 +16448,10 @@
           </a:bodyPr>
           <a:lstStyle/>
           <a:p>
+            <a:pPr algn="ctr"/>
             <a:r>
               <a:rPr lang="en-CA" sz="1100" dirty="0"/>
-              <a:t>BaseGlyphV1Record</a:t>
+              <a:t>BaseGlyphPaintRecord</a:t>
             </a:r>
             <a:endParaRPr lang="en-US" sz="1100" dirty="0"/>
           </a:p>
@@ -18875,7 +18876,7 @@
           <p:spPr>
             <a:xfrm>
               <a:off x="292139" y="2025215"/>
-              <a:ext cx="1162498" cy="261610"/>
+              <a:ext cx="1010213" cy="261610"/>
             </a:xfrm>
             <a:prstGeom prst="rect">
               <a:avLst/>
@@ -18890,7 +18891,7 @@
             <a:p>
               <a:r>
                 <a:rPr lang="en-CA" sz="1100" noProof="1"/>
-                <a:t>LayerV1List table</a:t>
+                <a:t>LayerList table</a:t>
               </a:r>
             </a:p>
           </p:txBody>
@@ -19528,12 +19529,12 @@
           <a:graphicData uri="http://schemas.openxmlformats.org/presentationml/2006/ole">
             <mc:AlternateContent xmlns:mc="http://schemas.openxmlformats.org/markup-compatibility/2006">
               <mc:Choice xmlns:v="urn:schemas-microsoft-com:vml" Requires="v">
-                <p:oleObj spid="_x0000_s1026" r:id="rId3" imgW="3809520" imgH="3809520" progId="">
+                <p:oleObj r:id="rId2" imgW="3809520" imgH="3809520" progId="">
                   <p:embed/>
                 </p:oleObj>
               </mc:Choice>
               <mc:Fallback>
-                <p:oleObj r:id="rId3" imgW="3809520" imgH="3809520" progId="">
+                <p:oleObj r:id="rId2" imgW="3809520" imgH="3809520" progId="">
                   <p:embed/>
                   <p:pic>
                     <p:nvPicPr>
@@ -19548,7 +19549,7 @@
                       <p:nvPr/>
                     </p:nvPicPr>
                     <p:blipFill>
-                      <a:blip r:embed="rId4"/>
+                      <a:blip r:embed="rId3"/>
                       <a:stretch>
                         <a:fillRect/>
                       </a:stretch>
@@ -19597,12 +19598,12 @@
           <a:graphicData uri="http://schemas.openxmlformats.org/presentationml/2006/ole">
             <mc:AlternateContent xmlns:mc="http://schemas.openxmlformats.org/markup-compatibility/2006">
               <mc:Choice xmlns:v="urn:schemas-microsoft-com:vml" Requires="v">
-                <p:oleObj spid="_x0000_s1027" r:id="rId5" imgW="3809520" imgH="3809520" progId="">
+                <p:oleObj r:id="rId4" imgW="3809520" imgH="3809520" progId="">
                   <p:embed/>
                 </p:oleObj>
               </mc:Choice>
               <mc:Fallback>
-                <p:oleObj r:id="rId5" imgW="3809520" imgH="3809520" progId="">
+                <p:oleObj r:id="rId4" imgW="3809520" imgH="3809520" progId="">
                   <p:embed/>
                   <p:pic>
                     <p:nvPicPr>
@@ -19617,7 +19618,7 @@
                       <p:nvPr/>
                     </p:nvPicPr>
                     <p:blipFill>
-                      <a:blip r:embed="rId6"/>
+                      <a:blip r:embed="rId5"/>
                       <a:stretch>
                         <a:fillRect/>
                       </a:stretch>
@@ -19666,12 +19667,12 @@
           <a:graphicData uri="http://schemas.openxmlformats.org/presentationml/2006/ole">
             <mc:AlternateContent xmlns:mc="http://schemas.openxmlformats.org/markup-compatibility/2006">
               <mc:Choice xmlns:v="urn:schemas-microsoft-com:vml" Requires="v">
-                <p:oleObj spid="_x0000_s1028" r:id="rId7" imgW="3809520" imgH="3809520" progId="">
+                <p:oleObj r:id="rId6" imgW="3809520" imgH="3809520" progId="">
                   <p:embed/>
                 </p:oleObj>
               </mc:Choice>
               <mc:Fallback>
-                <p:oleObj r:id="rId7" imgW="3809520" imgH="3809520" progId="">
+                <p:oleObj r:id="rId6" imgW="3809520" imgH="3809520" progId="">
                   <p:embed/>
                   <p:pic>
                     <p:nvPicPr>
@@ -19686,7 +19687,7 @@
                       <p:nvPr/>
                     </p:nvPicPr>
                     <p:blipFill>
-                      <a:blip r:embed="rId8"/>
+                      <a:blip r:embed="rId7"/>
                       <a:stretch>
                         <a:fillRect/>
                       </a:stretch>
@@ -19752,7 +19753,7 @@
           <p:nvPr/>
         </p:nvPicPr>
         <p:blipFill>
-          <a:blip r:embed="rId3"/>
+          <a:blip r:embed="rId2"/>
           <a:stretch>
             <a:fillRect/>
           </a:stretch>
@@ -20305,7 +20306,7 @@
           <p:nvPr/>
         </p:nvPicPr>
         <p:blipFill>
-          <a:blip r:embed="rId4"/>
+          <a:blip r:embed="rId3"/>
           <a:stretch>
             <a:fillRect/>
           </a:stretch>
@@ -20734,7 +20735,7 @@
           <p:nvPr/>
         </p:nvPicPr>
         <p:blipFill>
-          <a:blip r:embed="rId5"/>
+          <a:blip r:embed="rId4"/>
           <a:stretch>
             <a:fillRect/>
           </a:stretch>
@@ -20764,7 +20765,7 @@
           <p:nvPr/>
         </p:nvPicPr>
         <p:blipFill>
-          <a:blip r:embed="rId6">
+          <a:blip r:embed="rId5">
             <a:clrChange>
               <a:clrFrom>
                 <a:srgbClr val="FFFFFF"/>
@@ -21508,12 +21509,12 @@
           <a:graphicData uri="http://schemas.openxmlformats.org/presentationml/2006/ole">
             <mc:AlternateContent xmlns:mc="http://schemas.openxmlformats.org/markup-compatibility/2006">
               <mc:Choice xmlns:v="urn:schemas-microsoft-com:vml" Requires="v">
-                <p:oleObj spid="_x0000_s2050" r:id="rId7" imgW="3809520" imgH="3809520" progId="">
+                <p:oleObj r:id="rId6" imgW="3809520" imgH="3809520" progId="">
                   <p:embed/>
                 </p:oleObj>
               </mc:Choice>
               <mc:Fallback>
-                <p:oleObj r:id="rId7" imgW="3809520" imgH="3809520" progId="">
+                <p:oleObj r:id="rId6" imgW="3809520" imgH="3809520" progId="">
                   <p:embed/>
                   <p:pic>
                     <p:nvPicPr>
@@ -21528,7 +21529,7 @@
                       <p:nvPr/>
                     </p:nvPicPr>
                     <p:blipFill>
-                      <a:blip r:embed="rId8"/>
+                      <a:blip r:embed="rId7"/>
                       <a:stretch>
                         <a:fillRect/>
                       </a:stretch>
@@ -21577,12 +21578,12 @@
           <a:graphicData uri="http://schemas.openxmlformats.org/presentationml/2006/ole">
             <mc:AlternateContent xmlns:mc="http://schemas.openxmlformats.org/markup-compatibility/2006">
               <mc:Choice xmlns:v="urn:schemas-microsoft-com:vml" Requires="v">
-                <p:oleObj spid="_x0000_s2051" r:id="rId9" imgW="3809520" imgH="3809520" progId="">
+                <p:oleObj r:id="rId8" imgW="3809520" imgH="3809520" progId="">
                   <p:embed/>
                 </p:oleObj>
               </mc:Choice>
               <mc:Fallback>
-                <p:oleObj r:id="rId9" imgW="3809520" imgH="3809520" progId="">
+                <p:oleObj r:id="rId8" imgW="3809520" imgH="3809520" progId="">
                   <p:embed/>
                   <p:pic>
                     <p:nvPicPr>
@@ -21597,7 +21598,7 @@
                       <p:nvPr/>
                     </p:nvPicPr>
                     <p:blipFill>
-                      <a:blip r:embed="rId10"/>
+                      <a:blip r:embed="rId9"/>
                       <a:stretch>
                         <a:fillRect/>
                       </a:stretch>
@@ -21646,12 +21647,12 @@
           <a:graphicData uri="http://schemas.openxmlformats.org/presentationml/2006/ole">
             <mc:AlternateContent xmlns:mc="http://schemas.openxmlformats.org/markup-compatibility/2006">
               <mc:Choice xmlns:v="urn:schemas-microsoft-com:vml" Requires="v">
-                <p:oleObj spid="_x0000_s2052" r:id="rId11" imgW="3809520" imgH="3809520" progId="">
+                <p:oleObj r:id="rId10" imgW="3809520" imgH="3809520" progId="">
                   <p:embed/>
                 </p:oleObj>
               </mc:Choice>
               <mc:Fallback>
-                <p:oleObj r:id="rId11" imgW="3809520" imgH="3809520" progId="">
+                <p:oleObj r:id="rId10" imgW="3809520" imgH="3809520" progId="">
                   <p:embed/>
                   <p:pic>
                     <p:nvPicPr>
@@ -21666,7 +21667,7 @@
                       <p:nvPr/>
                     </p:nvPicPr>
                     <p:blipFill>
-                      <a:blip r:embed="rId12"/>
+                      <a:blip r:embed="rId11"/>
                       <a:stretch>
                         <a:fillRect/>
                       </a:stretch>
@@ -22150,7 +22151,7 @@
           <p:spPr>
             <a:xfrm>
               <a:off x="2267466" y="1667315"/>
-              <a:ext cx="1162498" cy="261610"/>
+              <a:ext cx="1010213" cy="261610"/>
             </a:xfrm>
             <a:prstGeom prst="rect">
               <a:avLst/>
@@ -22165,7 +22166,7 @@
             <a:p>
               <a:r>
                 <a:rPr lang="en-CA" sz="1100" noProof="1"/>
-                <a:t>LayerV1List table</a:t>
+                <a:t>LayerList table</a:t>
               </a:r>
             </a:p>
           </p:txBody>
@@ -23212,7 +23213,7 @@
         <p:spPr>
           <a:xfrm>
             <a:off x="5438559" y="1878330"/>
-            <a:ext cx="1162498" cy="261610"/>
+            <a:ext cx="1010213" cy="261610"/>
           </a:xfrm>
           <a:prstGeom prst="rect">
             <a:avLst/>
@@ -23227,7 +23228,7 @@
           <a:p>
             <a:r>
               <a:rPr lang="en-CA" sz="1100" noProof="1"/>
-              <a:t>LayerV1List table</a:t>
+              <a:t>LayerList table</a:t>
             </a:r>
           </a:p>
         </p:txBody>
@@ -23668,7 +23669,7 @@
           <p:nvPr/>
         </p:nvPicPr>
         <p:blipFill>
-          <a:blip r:embed="rId3"/>
+          <a:blip r:embed="rId2"/>
           <a:stretch>
             <a:fillRect/>
           </a:stretch>
@@ -23748,12 +23749,12 @@
           <a:graphicData uri="http://schemas.openxmlformats.org/presentationml/2006/ole">
             <mc:AlternateContent xmlns:mc="http://schemas.openxmlformats.org/markup-compatibility/2006">
               <mc:Choice xmlns:v="urn:schemas-microsoft-com:vml" Requires="v">
-                <p:oleObj spid="_x0000_s3074" r:id="rId4" imgW="3809520" imgH="3809520" progId="">
+                <p:oleObj r:id="rId3" imgW="3809520" imgH="3809520" progId="">
                   <p:embed/>
                 </p:oleObj>
               </mc:Choice>
               <mc:Fallback>
-                <p:oleObj r:id="rId4" imgW="3809520" imgH="3809520" progId="">
+                <p:oleObj r:id="rId3" imgW="3809520" imgH="3809520" progId="">
                   <p:embed/>
                   <p:pic>
                     <p:nvPicPr>
@@ -23768,7 +23769,7 @@
                       <p:nvPr/>
                     </p:nvPicPr>
                     <p:blipFill>
-                      <a:blip r:embed="rId5"/>
+                      <a:blip r:embed="rId4"/>
                       <a:stretch>
                         <a:fillRect/>
                       </a:stretch>
@@ -23804,7 +23805,7 @@
           <p:nvPr/>
         </p:nvPicPr>
         <p:blipFill>
-          <a:blip r:embed="rId6"/>
+          <a:blip r:embed="rId5"/>
           <a:stretch>
             <a:fillRect/>
           </a:stretch>
@@ -23834,7 +23835,7 @@
           <p:nvPr/>
         </p:nvPicPr>
         <p:blipFill>
-          <a:blip r:embed="rId7"/>
+          <a:blip r:embed="rId6"/>
           <a:stretch>
             <a:fillRect/>
           </a:stretch>
@@ -25110,12 +25111,12 @@
           <a:graphicData uri="http://schemas.openxmlformats.org/presentationml/2006/ole">
             <mc:AlternateContent xmlns:mc="http://schemas.openxmlformats.org/markup-compatibility/2006">
               <mc:Choice xmlns:v="urn:schemas-microsoft-com:vml" Requires="v">
-                <p:oleObj spid="_x0000_s3075" r:id="rId8" imgW="3809520" imgH="3809520" progId="">
+                <p:oleObj r:id="rId7" imgW="3809520" imgH="3809520" progId="">
                   <p:embed/>
                 </p:oleObj>
               </mc:Choice>
               <mc:Fallback>
-                <p:oleObj r:id="rId8" imgW="3809520" imgH="3809520" progId="">
+                <p:oleObj r:id="rId7" imgW="3809520" imgH="3809520" progId="">
                   <p:embed/>
                   <p:pic>
                     <p:nvPicPr>
@@ -25130,7 +25131,7 @@
                       <p:nvPr/>
                     </p:nvPicPr>
                     <p:blipFill>
-                      <a:blip r:embed="rId5"/>
+                      <a:blip r:embed="rId4"/>
                       <a:stretch>
                         <a:fillRect/>
                       </a:stretch>
@@ -25573,7 +25574,7 @@
         <p:spPr>
           <a:xfrm>
             <a:off x="5438559" y="1878330"/>
-            <a:ext cx="1162498" cy="261610"/>
+            <a:ext cx="1010213" cy="261610"/>
           </a:xfrm>
           <a:prstGeom prst="rect">
             <a:avLst/>
@@ -25588,7 +25589,7 @@
           <a:p>
             <a:r>
               <a:rPr lang="en-CA" sz="1100" noProof="1"/>
-              <a:t>LayerV1List table</a:t>
+              <a:t>LayerList table</a:t>
             </a:r>
           </a:p>
         </p:txBody>
@@ -26029,7 +26030,7 @@
           <p:nvPr/>
         </p:nvPicPr>
         <p:blipFill>
-          <a:blip r:embed="rId3"/>
+          <a:blip r:embed="rId2"/>
           <a:stretch>
             <a:fillRect/>
           </a:stretch>
@@ -26121,12 +26122,12 @@
           <a:graphicData uri="http://schemas.openxmlformats.org/presentationml/2006/ole">
             <mc:AlternateContent xmlns:mc="http://schemas.openxmlformats.org/markup-compatibility/2006">
               <mc:Choice xmlns:v="urn:schemas-microsoft-com:vml" Requires="v">
-                <p:oleObj spid="_x0000_s4098" r:id="rId4" imgW="3809520" imgH="3809520" progId="">
+                <p:oleObj r:id="rId3" imgW="3809520" imgH="3809520" progId="">
                   <p:embed/>
                 </p:oleObj>
               </mc:Choice>
               <mc:Fallback>
-                <p:oleObj r:id="rId4" imgW="3809520" imgH="3809520" progId="">
+                <p:oleObj r:id="rId3" imgW="3809520" imgH="3809520" progId="">
                   <p:embed/>
                   <p:pic>
                     <p:nvPicPr>
@@ -26141,7 +26142,7 @@
                       <p:nvPr/>
                     </p:nvPicPr>
                     <p:blipFill>
-                      <a:blip r:embed="rId5"/>
+                      <a:blip r:embed="rId4"/>
                       <a:stretch>
                         <a:fillRect/>
                       </a:stretch>
@@ -26177,7 +26178,7 @@
           <p:nvPr/>
         </p:nvPicPr>
         <p:blipFill>
-          <a:blip r:embed="rId6"/>
+          <a:blip r:embed="rId5"/>
           <a:stretch>
             <a:fillRect/>
           </a:stretch>
@@ -26207,7 +26208,7 @@
           <p:nvPr/>
         </p:nvPicPr>
         <p:blipFill>
-          <a:blip r:embed="rId7"/>
+          <a:blip r:embed="rId6"/>
           <a:stretch>
             <a:fillRect/>
           </a:stretch>
@@ -27335,7 +27336,7 @@
         <p:spPr>
           <a:xfrm>
             <a:off x="2342987" y="4218840"/>
-            <a:ext cx="1343638" cy="261610"/>
+            <a:ext cx="1483098" cy="261610"/>
           </a:xfrm>
           <a:prstGeom prst="rect">
             <a:avLst/>
@@ -27350,7 +27351,7 @@
           <a:p>
             <a:r>
               <a:rPr lang="en-CA" sz="1100" dirty="0"/>
-              <a:t>BaseGlyphV1Record</a:t>
+              <a:t>BaseGlyphPaintRecord</a:t>
             </a:r>
             <a:endParaRPr lang="en-US" sz="1100" dirty="0"/>
           </a:p>
@@ -27681,7 +27682,7 @@
         <p:spPr>
           <a:xfrm>
             <a:off x="2342987" y="2714986"/>
-            <a:ext cx="1343638" cy="261610"/>
+            <a:ext cx="1483098" cy="261610"/>
           </a:xfrm>
           <a:prstGeom prst="rect">
             <a:avLst/>
@@ -27696,7 +27697,7 @@
           <a:p>
             <a:r>
               <a:rPr lang="en-CA" sz="1100" dirty="0"/>
-              <a:t>BaseGlyphV1Record</a:t>
+              <a:t>BaseGlyphPaintRecord</a:t>
             </a:r>
             <a:endParaRPr lang="en-US" sz="1100" dirty="0"/>
           </a:p>
@@ -29557,7 +29558,7 @@
           <p:spPr>
             <a:xfrm>
               <a:off x="292139" y="2025215"/>
-              <a:ext cx="1162498" cy="261610"/>
+              <a:ext cx="1010213" cy="261610"/>
             </a:xfrm>
             <a:prstGeom prst="rect">
               <a:avLst/>
@@ -29572,7 +29573,7 @@
             <a:p>
               <a:r>
                 <a:rPr lang="en-CA" sz="1100" noProof="1"/>
-                <a:t>LayerV1List table</a:t>
+                <a:t>LayerList table</a:t>
               </a:r>
             </a:p>
           </p:txBody>

</xml_diff>